<commit_message>
nearest neighbour performance presentation fix
</commit_message>
<xml_diff>
--- a/doc/GQW/Raschupkin_EV_UAV_Route_Planning.pptx
+++ b/doc/GQW/Raschupkin_EV_UAV_Route_Planning.pptx
@@ -284,7 +284,7 @@
             </a:pPr>
             <a:fld id="{BCC18F51-09EC-435C-A3BA-64A766E099C0}" type="datetimeFigureOut">
               <a:rPr lang="en-US"/>
-              <a:t>2024-06-01</a:t>
+              <a:t>2024-06-03</a:t>
             </a:fld>
             <a:endParaRPr lang="en-US"/>
           </a:p>
@@ -475,7 +475,7 @@
             </a:pPr>
             <a:fld id="{BCC18F51-09EC-435C-A3BA-64A766E099C0}" type="datetimeFigureOut">
               <a:rPr lang="en-US"/>
-              <a:t>2024-06-01</a:t>
+              <a:t>2024-06-03</a:t>
             </a:fld>
             <a:endParaRPr lang="en-US"/>
           </a:p>
@@ -676,7 +676,7 @@
             </a:pPr>
             <a:fld id="{BCC18F51-09EC-435C-A3BA-64A766E099C0}" type="datetimeFigureOut">
               <a:rPr lang="en-US"/>
-              <a:t>2024-06-01</a:t>
+              <a:t>2024-06-03</a:t>
             </a:fld>
             <a:endParaRPr lang="en-US"/>
           </a:p>
@@ -867,7 +867,7 @@
             </a:pPr>
             <a:fld id="{BCC18F51-09EC-435C-A3BA-64A766E099C0}" type="datetimeFigureOut">
               <a:rPr lang="en-US"/>
-              <a:t>2024-06-01</a:t>
+              <a:t>2024-06-03</a:t>
             </a:fld>
             <a:endParaRPr lang="en-US"/>
           </a:p>
@@ -1124,7 +1124,7 @@
             </a:pPr>
             <a:fld id="{BCC18F51-09EC-435C-A3BA-64A766E099C0}" type="datetimeFigureOut">
               <a:rPr lang="en-US"/>
-              <a:t>2024-06-01</a:t>
+              <a:t>2024-06-03</a:t>
             </a:fld>
             <a:endParaRPr lang="en-US"/>
           </a:p>
@@ -1390,7 +1390,7 @@
             </a:pPr>
             <a:fld id="{BCC18F51-09EC-435C-A3BA-64A766E099C0}" type="datetimeFigureOut">
               <a:rPr lang="en-US"/>
-              <a:t>2024-06-01</a:t>
+              <a:t>2024-06-03</a:t>
             </a:fld>
             <a:endParaRPr lang="en-US"/>
           </a:p>
@@ -1797,7 +1797,7 @@
             </a:pPr>
             <a:fld id="{BCC18F51-09EC-435C-A3BA-64A766E099C0}" type="datetimeFigureOut">
               <a:rPr lang="en-US"/>
-              <a:t>2024-06-01</a:t>
+              <a:t>2024-06-03</a:t>
             </a:fld>
             <a:endParaRPr lang="en-US"/>
           </a:p>
@@ -1923,7 +1923,7 @@
             </a:pPr>
             <a:fld id="{BCC18F51-09EC-435C-A3BA-64A766E099C0}" type="datetimeFigureOut">
               <a:rPr lang="en-US"/>
-              <a:t>2024-06-01</a:t>
+              <a:t>2024-06-03</a:t>
             </a:fld>
             <a:endParaRPr lang="en-US"/>
           </a:p>
@@ -2024,7 +2024,7 @@
             </a:pPr>
             <a:fld id="{BCC18F51-09EC-435C-A3BA-64A766E099C0}" type="datetimeFigureOut">
               <a:rPr lang="en-US"/>
-              <a:t>2024-06-01</a:t>
+              <a:t>2024-06-03</a:t>
             </a:fld>
             <a:endParaRPr lang="en-US"/>
           </a:p>
@@ -2325,7 +2325,7 @@
             </a:pPr>
             <a:fld id="{BCC18F51-09EC-435C-A3BA-64A766E099C0}" type="datetimeFigureOut">
               <a:rPr lang="en-US"/>
-              <a:t>2024-06-01</a:t>
+              <a:t>2024-06-03</a:t>
             </a:fld>
             <a:endParaRPr lang="en-US"/>
           </a:p>
@@ -2595,7 +2595,7 @@
             </a:pPr>
             <a:fld id="{BCC18F51-09EC-435C-A3BA-64A766E099C0}" type="datetimeFigureOut">
               <a:rPr lang="en-US"/>
-              <a:t>2024-06-01</a:t>
+              <a:t>2024-06-03</a:t>
             </a:fld>
             <a:endParaRPr lang="en-US"/>
           </a:p>
@@ -2829,7 +2829,7 @@
             </a:pPr>
             <a:fld id="{BCC18F51-09EC-435C-A3BA-64A766E099C0}" type="datetimeFigureOut">
               <a:rPr lang="en-US"/>
-              <a:t>2024-06-01</a:t>
+              <a:t>2024-06-03</a:t>
             </a:fld>
             <a:endParaRPr lang="en-US"/>
           </a:p>
@@ -4660,7 +4660,7 @@
             <p:ph idx="1"/>
             <p:extLst>
               <p:ext uri="{D42A27DB-BD31-4B8C-83A1-F6EECF244321}">
-                <p14:modId xmlns:p14="http://schemas.microsoft.com/office/powerpoint/2010/main" val="1954761026"/>
+                <p14:modId xmlns:p14="http://schemas.microsoft.com/office/powerpoint/2010/main" val="948033085"/>
               </p:ext>
             </p:extLst>
           </p:nvPr>
@@ -5283,7 +5283,25 @@
                         <a:rPr lang="en-US" sz="1400" dirty="0">
                           <a:effectLst/>
                         </a:rPr>
-                        <a:t>O(N)</a:t>
+                        <a:t>O(N</a:t>
+                      </a:r>
+                      <a:r>
+                        <a:rPr lang="en-US" sz="1400" baseline="30000" dirty="0">
+                          <a:solidFill>
+                            <a:schemeClr val="dk1"/>
+                          </a:solidFill>
+                          <a:effectLst/>
+                          <a:latin typeface="+mn-lt"/>
+                          <a:ea typeface="+mn-ea"/>
+                          <a:cs typeface="+mn-cs"/>
+                        </a:rPr>
+                        <a:t>2</a:t>
+                      </a:r>
+                      <a:r>
+                        <a:rPr lang="en-US" sz="1400" dirty="0">
+                          <a:effectLst/>
+                        </a:rPr>
+                        <a:t>)</a:t>
                       </a:r>
                       <a:endParaRPr lang="en-US" sz="1200" dirty="0">
                         <a:effectLst/>

</xml_diff>